<commit_message>
Switching from Thimble to Glitch
</commit_message>
<xml_diff>
--- a/powerpoints/05-web-detective.pptx
+++ b/powerpoints/05-web-detective.pptx
@@ -5473,14 +5473,6 @@
             <a:r>
               <a:rPr/>
               <a:t>following</a:t>
-            </a:r>
-            <a:r>
-              <a:rPr/>
-              <a:t> </a:t>
-            </a:r>
-            <a:r>
-              <a:rPr/>
-              <a:t>seven</a:t>
             </a:r>
             <a:r>
               <a:rPr/>

</xml_diff>